<commit_message>
SS-57 System Architecture Diagram update
Corrected arrows between sub controllers to controllers
</commit_message>
<xml_diff>
--- a/SystemArchitecture/Detailed Systems architecture overview diagram -SS-57.pptx
+++ b/SystemArchitecture/Detailed Systems architecture overview diagram -SS-57.pptx
@@ -4800,7 +4800,6 @@
           </p:cNvPr>
           <p:cNvCxnSpPr>
             <a:cxnSpLocks/>
-            <a:stCxn id="33" idx="3"/>
             <a:endCxn id="44" idx="1"/>
           </p:cNvCxnSpPr>
           <p:nvPr/>
@@ -4808,12 +4807,13 @@
         <p:spPr>
           <a:xfrm flipV="1">
             <a:off x="4044904" y="1879295"/>
-            <a:ext cx="771304" cy="900935"/>
+            <a:ext cx="771304" cy="745499"/>
           </a:xfrm>
           <a:prstGeom prst="straightConnector1">
             <a:avLst/>
           </a:prstGeom>
           <a:ln>
+            <a:headEnd type="triangle"/>
             <a:tailEnd type="triangle"/>
           </a:ln>
         </p:spPr>
@@ -4857,6 +4857,7 @@
             <a:avLst/>
           </a:prstGeom>
           <a:ln>
+            <a:headEnd type="triangle"/>
             <a:tailEnd type="triangle"/>
           </a:ln>
         </p:spPr>
@@ -4886,20 +4887,20 @@
           </p:cNvPr>
           <p:cNvCxnSpPr>
             <a:cxnSpLocks/>
-            <a:stCxn id="33" idx="3"/>
             <a:endCxn id="47" idx="1"/>
           </p:cNvCxnSpPr>
           <p:nvPr/>
         </p:nvCxnSpPr>
         <p:spPr>
           <a:xfrm>
-            <a:off x="4044904" y="2780230"/>
-            <a:ext cx="765916" cy="199030"/>
+            <a:off x="4044904" y="2905760"/>
+            <a:ext cx="765916" cy="73500"/>
           </a:xfrm>
           <a:prstGeom prst="straightConnector1">
             <a:avLst/>
           </a:prstGeom>
           <a:ln>
+            <a:headEnd type="triangle"/>
             <a:tailEnd type="triangle"/>
           </a:ln>
         </p:spPr>
@@ -5290,6 +5291,7 @@
             <a:avLst/>
           </a:prstGeom>
           <a:ln>
+            <a:headEnd type="triangle"/>
             <a:tailEnd type="triangle"/>
           </a:ln>
         </p:spPr>
@@ -5319,20 +5321,20 @@
           </p:cNvPr>
           <p:cNvCxnSpPr>
             <a:cxnSpLocks/>
-            <a:stCxn id="120" idx="3"/>
             <a:endCxn id="125" idx="1"/>
           </p:cNvCxnSpPr>
           <p:nvPr/>
         </p:nvCxnSpPr>
         <p:spPr>
           <a:xfrm flipV="1">
-            <a:off x="3850328" y="4964978"/>
-            <a:ext cx="899990" cy="1511231"/>
+            <a:off x="3858557" y="4964978"/>
+            <a:ext cx="891761" cy="1370973"/>
           </a:xfrm>
           <a:prstGeom prst="straightConnector1">
             <a:avLst/>
           </a:prstGeom>
           <a:ln>
+            <a:headEnd type="triangle"/>
             <a:tailEnd type="triangle"/>
           </a:ln>
         </p:spPr>
@@ -5362,20 +5364,20 @@
           </p:cNvPr>
           <p:cNvCxnSpPr>
             <a:cxnSpLocks/>
-            <a:stCxn id="120" idx="3"/>
             <a:endCxn id="126" idx="1"/>
           </p:cNvCxnSpPr>
           <p:nvPr/>
         </p:nvCxnSpPr>
         <p:spPr>
           <a:xfrm flipV="1">
-            <a:off x="3850328" y="6473284"/>
-            <a:ext cx="1177227" cy="2925"/>
+            <a:off x="3858557" y="6473284"/>
+            <a:ext cx="1168998" cy="125636"/>
           </a:xfrm>
           <a:prstGeom prst="straightConnector1">
             <a:avLst/>
           </a:prstGeom>
           <a:ln>
+            <a:headEnd type="triangle"/>
             <a:tailEnd type="triangle"/>
           </a:ln>
         </p:spPr>
@@ -6078,20 +6080,20 @@
           </p:cNvPr>
           <p:cNvCxnSpPr>
             <a:cxnSpLocks/>
-            <a:stCxn id="64" idx="3"/>
             <a:endCxn id="125" idx="1"/>
           </p:cNvCxnSpPr>
           <p:nvPr/>
         </p:nvCxnSpPr>
         <p:spPr>
           <a:xfrm>
-            <a:off x="3847779" y="4164568"/>
-            <a:ext cx="902539" cy="800410"/>
+            <a:off x="3847779" y="4304521"/>
+            <a:ext cx="902539" cy="660457"/>
           </a:xfrm>
           <a:prstGeom prst="straightConnector1">
             <a:avLst/>
           </a:prstGeom>
           <a:ln>
+            <a:headEnd type="triangle"/>
             <a:tailEnd type="triangle"/>
           </a:ln>
         </p:spPr>
@@ -6199,6 +6201,7 @@
             <a:avLst/>
           </a:prstGeom>
           <a:ln>
+            <a:headEnd type="triangle"/>
             <a:tailEnd type="triangle"/>
           </a:ln>
         </p:spPr>
@@ -6292,20 +6295,20 @@
           </p:cNvPr>
           <p:cNvCxnSpPr>
             <a:cxnSpLocks/>
-            <a:stCxn id="64" idx="3"/>
             <a:endCxn id="77" idx="1"/>
           </p:cNvCxnSpPr>
           <p:nvPr/>
         </p:nvCxnSpPr>
         <p:spPr>
           <a:xfrm flipV="1">
-            <a:off x="3847779" y="3801970"/>
-            <a:ext cx="871434" cy="362598"/>
+            <a:off x="3828043" y="3801970"/>
+            <a:ext cx="891170" cy="248863"/>
           </a:xfrm>
           <a:prstGeom prst="straightConnector1">
             <a:avLst/>
           </a:prstGeom>
           <a:ln>
+            <a:headEnd type="triangle"/>
             <a:tailEnd type="triangle"/>
           </a:ln>
         </p:spPr>
@@ -8115,6 +8118,7 @@
             <a:avLst/>
           </a:prstGeom>
           <a:ln>
+            <a:headEnd type="triangle"/>
             <a:tailEnd type="triangle"/>
           </a:ln>
         </p:spPr>
@@ -8144,7 +8148,6 @@
           </p:cNvPr>
           <p:cNvCxnSpPr>
             <a:cxnSpLocks/>
-            <a:stCxn id="120" idx="3"/>
             <a:endCxn id="72" idx="1"/>
           </p:cNvCxnSpPr>
           <p:nvPr/>
@@ -8152,12 +8155,13 @@
         <p:spPr>
           <a:xfrm flipV="1">
             <a:off x="3763319" y="2292234"/>
-            <a:ext cx="571645" cy="171446"/>
+            <a:ext cx="571645" cy="43296"/>
           </a:xfrm>
           <a:prstGeom prst="straightConnector1">
             <a:avLst/>
           </a:prstGeom>
           <a:ln>
+            <a:headEnd type="triangle"/>
             <a:tailEnd type="triangle"/>
           </a:ln>
         </p:spPr>
@@ -8187,20 +8191,20 @@
           </p:cNvPr>
           <p:cNvCxnSpPr>
             <a:cxnSpLocks/>
-            <a:stCxn id="120" idx="3"/>
             <a:endCxn id="126" idx="1"/>
           </p:cNvCxnSpPr>
           <p:nvPr/>
         </p:nvCxnSpPr>
         <p:spPr>
           <a:xfrm>
-            <a:off x="3763319" y="2463680"/>
-            <a:ext cx="568217" cy="1008927"/>
+            <a:off x="3763319" y="2566854"/>
+            <a:ext cx="568217" cy="905753"/>
           </a:xfrm>
           <a:prstGeom prst="straightConnector1">
             <a:avLst/>
           </a:prstGeom>
           <a:ln>
+            <a:headEnd type="triangle"/>
             <a:tailEnd type="triangle"/>
           </a:ln>
         </p:spPr>
@@ -8952,7 +8956,6 @@
           </p:cNvPr>
           <p:cNvCxnSpPr>
             <a:cxnSpLocks/>
-            <a:stCxn id="93" idx="3"/>
             <a:endCxn id="102" idx="1"/>
           </p:cNvCxnSpPr>
           <p:nvPr/>
@@ -8960,12 +8963,13 @@
         <p:spPr>
           <a:xfrm flipV="1">
             <a:off x="4066746" y="4632042"/>
-            <a:ext cx="478548" cy="465280"/>
+            <a:ext cx="478548" cy="349533"/>
           </a:xfrm>
           <a:prstGeom prst="straightConnector1">
             <a:avLst/>
           </a:prstGeom>
           <a:ln>
+            <a:headEnd type="triangle"/>
             <a:tailEnd type="triangle"/>
           </a:ln>
         </p:spPr>
@@ -9073,6 +9077,7 @@
             <a:avLst/>
           </a:prstGeom>
           <a:ln>
+            <a:headEnd type="triangle"/>
             <a:tailEnd type="triangle"/>
           </a:ln>
         </p:spPr>

</xml_diff>